<commit_message>
steps to create a repo
</commit_message>
<xml_diff>
--- a/slides/instruction/principleWindows_extra.pptx
+++ b/slides/instruction/principleWindows_extra.pptx
@@ -3619,7 +3619,7 @@
           <a:p>
             <a:fld id="{62B690D2-9F6C-4A40-B045-5871089CDE7B}" type="datetimeFigureOut">
               <a:rPr lang="zh-CN" altLang="en-US" smtClean="0"/>
-              <a:t>2020/10/13</a:t>
+              <a:t>2020/10/14</a:t>
             </a:fld>
             <a:endParaRPr lang="zh-CN" altLang="en-US"/>
           </a:p>
@@ -8385,7 +8385,7 @@
           <a:p>
             <a:fld id="{F0A08C6D-CA89-457F-88D7-56281A3E4E44}" type="datetimeFigureOut">
               <a:rPr lang="zh-CN" altLang="en-US" smtClean="0"/>
-              <a:t>2020/10/13</a:t>
+              <a:t>2020/10/14</a:t>
             </a:fld>
             <a:endParaRPr lang="zh-CN" altLang="en-US"/>
           </a:p>
@@ -13219,8 +13219,8 @@
         </p:nvSpPr>
         <p:spPr bwMode="auto">
           <a:xfrm>
-            <a:off x="5001492" y="1158459"/>
-            <a:ext cx="6747163" cy="4185761"/>
+            <a:off x="5001492" y="1172801"/>
+            <a:ext cx="6747163" cy="4431983"/>
           </a:xfrm>
           <a:prstGeom prst="rect">
             <a:avLst/>
@@ -13678,8 +13678,27 @@
                 <a:latin typeface="Arial Unicode MS" panose="020B0604020202020204" pitchFamily="34" charset="-122"/>
                 <a:ea typeface="SFMono-Regular"/>
               </a:rPr>
-              <a:t>// Same as previous </a:t>
-            </a:r>
+              <a:t>// Same as previous</a:t>
+            </a:r>
+            <a:endParaRPr lang="en-US" altLang="zh-CN" sz="1600" dirty="0">
+              <a:solidFill>
+                <a:schemeClr val="accent5">
+                  <a:lumMod val="75000"/>
+                </a:schemeClr>
+              </a:solidFill>
+              <a:latin typeface="Arial Unicode MS" panose="020B0604020202020204" pitchFamily="34" charset="-122"/>
+              <a:ea typeface="SFMono-Regular"/>
+            </a:endParaRPr>
+          </a:p>
+          <a:p>
+            <a:pPr lvl="0" defTabSz="914400" eaLnBrk="0" fontAlgn="base" hangingPunct="0">
+              <a:spcBef>
+                <a:spcPct val="0"/>
+              </a:spcBef>
+              <a:spcAft>
+                <a:spcPct val="0"/>
+              </a:spcAft>
+            </a:pPr>
             <a:r>
               <a:rPr lang="zh-CN" altLang="zh-CN" sz="1600" dirty="0">
                 <a:solidFill>

</xml_diff>